<commit_message>
add db check assignment to data slides
</commit_message>
<xml_diff>
--- a/02 - Case Studies and Acquiring Data/data.pptx
+++ b/02 - Case Studies and Acquiring Data/data.pptx
@@ -29,7 +29,7 @@
     <p:sldId id="291" r:id="rId20"/>
     <p:sldId id="293" r:id="rId21"/>
     <p:sldId id="302" r:id="rId22"/>
-    <p:sldId id="297" r:id="rId23"/>
+    <p:sldId id="303" r:id="rId23"/>
   </p:sldIdLst>
   <p:sldSz cx="12192000" cy="6858000"/>
   <p:notesSz cx="6858000" cy="9144000"/>
@@ -267,7 +267,7 @@
       <p15:sldGuideLst xmlns:p15="http://schemas.microsoft.com/office/powerpoint/2012/main"/>
     </p:ext>
     <p:ext uri="http://customooxmlschemas.google.com/">
-      <go:slidesCustomData xmlns="" xmlns:mc="http://schemas.openxmlformats.org/markup-compatibility/2006" xmlns:mv="urn:schemas-microsoft-com:mac:vml" xmlns:c="http://schemas.openxmlformats.org/drawingml/2006/chart" xmlns:dgm="http://schemas.openxmlformats.org/drawingml/2006/diagram" xmlns:o="urn:schemas-microsoft-com:office:office" xmlns:v="urn:schemas-microsoft-com:vml" xmlns:pvml="urn:schemas-microsoft-com:office:powerpoint" xmlns:com="http://schemas.openxmlformats.org/drawingml/2006/compatibility" xmlns:p14="http://schemas.microsoft.com/office/powerpoint/2010/main" xmlns:p15="http://schemas.microsoft.com/office/powerpoint/2012/main" xmlns:go="http://customooxmlschemas.google.com/" r:id="rId30" roundtripDataSignature="AMtx7mjFyVUGRZWio+dc9dxzYsimUxNJbg=="/>
+      <go:slidesCustomData xmlns:go="http://customooxmlschemas.google.com/" xmlns:p15="http://schemas.microsoft.com/office/powerpoint/2012/main" xmlns:p14="http://schemas.microsoft.com/office/powerpoint/2010/main" xmlns:com="http://schemas.openxmlformats.org/drawingml/2006/compatibility" xmlns:pvml="urn:schemas-microsoft-com:office:powerpoint" xmlns:v="urn:schemas-microsoft-com:vml" xmlns:o="urn:schemas-microsoft-com:office:office" xmlns:dgm="http://schemas.openxmlformats.org/drawingml/2006/diagram" xmlns:c="http://schemas.openxmlformats.org/drawingml/2006/chart" xmlns:mv="urn:schemas-microsoft-com:mac:vml" xmlns:mc="http://schemas.openxmlformats.org/markup-compatibility/2006" xmlns="" r:id="rId30" roundtripDataSignature="AMtx7mjFyVUGRZWio+dc9dxzYsimUxNJbg=="/>
     </p:ext>
   </p:extLst>
 </p:presentation>
@@ -13910,6 +13910,17 @@
             </a:pPr>
             <a:r>
               <a:rPr lang="en-US" dirty="0"/>
+              <a:t>Monday: quick assignment to check database connection</a:t>
+            </a:r>
+          </a:p>
+          <a:p>
+            <a:pPr lvl="1">
+              <a:spcBef>
+                <a:spcPts val="1000"/>
+              </a:spcBef>
+            </a:pPr>
+            <a:r>
+              <a:rPr lang="en-US" dirty="0"/>
               <a:t>Tuesday: weekly feedback form</a:t>
             </a:r>
           </a:p>
@@ -14259,7 +14270,29 @@
             </a:pPr>
             <a:r>
               <a:rPr lang="en-US" dirty="0"/>
+              <a:t>Monday: quick assignment to check database connection</a:t>
+            </a:r>
+          </a:p>
+          <a:p>
+            <a:pPr lvl="1">
+              <a:spcBef>
+                <a:spcPts val="1000"/>
+              </a:spcBef>
+            </a:pPr>
+            <a:r>
+              <a:rPr lang="en-US" dirty="0"/>
               <a:t>Tuesday: weekly feedback form</a:t>
+            </a:r>
+          </a:p>
+          <a:p>
+            <a:pPr lvl="1">
+              <a:spcBef>
+                <a:spcPts val="1000"/>
+              </a:spcBef>
+            </a:pPr>
+            <a:r>
+              <a:rPr lang="en-US" dirty="0"/>
+              <a:t>Tuesday: Data Exploration + Teamwork</a:t>
             </a:r>
           </a:p>
           <a:p>
@@ -14303,7 +14336,7 @@
     </p:spTree>
     <p:extLst>
       <p:ext uri="{BB962C8B-B14F-4D97-AF65-F5344CB8AC3E}">
-        <p14:creationId xmlns:p14="http://schemas.microsoft.com/office/powerpoint/2010/main" val="1079067400"/>
+        <p14:creationId xmlns:p14="http://schemas.microsoft.com/office/powerpoint/2010/main" val="2953224412"/>
       </p:ext>
     </p:extLst>
   </p:cSld>

</xml_diff>